<commit_message>
updates to starter code
</commit_message>
<xml_diff>
--- a/lessons/lesson-8/08-intro-to-classification.pptx
+++ b/lessons/lesson-8/08-intro-to-classification.pptx
@@ -13508,7 +13508,7 @@
             <a:r>
               <a:rPr lang="en-US" sz="2800" b="0" i="1" u="none" strike="noStrike" cap="none" dirty="0" smtClean="0">
                 <a:solidFill>
-                  <a:srgbClr val="E52123"/>
+                  <a:srgbClr val="FF0433"/>
                 </a:solidFill>
                 <a:latin typeface="Georgia"/>
                 <a:ea typeface="Georgia"/>
@@ -13519,7 +13519,7 @@
             </a:r>
             <a:endParaRPr lang="en-US" sz="2800" b="0" i="1" u="none" strike="noStrike" cap="none" dirty="0">
               <a:solidFill>
-                <a:srgbClr val="E52123"/>
+                <a:srgbClr val="FF0433"/>
               </a:solidFill>
               <a:latin typeface="Georgia"/>
               <a:ea typeface="Georgia"/>
@@ -14033,6 +14033,13 @@
   <p:clrMapOvr>
     <a:masterClrMapping/>
   </p:clrMapOvr>
+  <p:timing>
+    <p:tnLst>
+      <p:par>
+        <p:cTn id="1" dur="indefinite" restart="never" nodeType="tmRoot"/>
+      </p:par>
+    </p:tnLst>
+  </p:timing>
 </p:sld>
 </file>
 
@@ -14172,6 +14179,13 @@
   <p:clrMapOvr>
     <a:masterClrMapping/>
   </p:clrMapOvr>
+  <p:timing>
+    <p:tnLst>
+      <p:par>
+        <p:cTn id="1" dur="indefinite" restart="never" nodeType="tmRoot"/>
+      </p:par>
+    </p:tnLst>
+  </p:timing>
 </p:sld>
 </file>
 
@@ -14568,6 +14582,13 @@
   <p:clrMapOvr>
     <a:masterClrMapping/>
   </p:clrMapOvr>
+  <p:timing>
+    <p:tnLst>
+      <p:par>
+        <p:cTn id="1" dur="indefinite" restart="never" nodeType="tmRoot"/>
+      </p:par>
+    </p:tnLst>
+  </p:timing>
 </p:sld>
 </file>
 
@@ -14745,6 +14766,13 @@
   <p:clrMapOvr>
     <a:masterClrMapping/>
   </p:clrMapOvr>
+  <p:timing>
+    <p:tnLst>
+      <p:par>
+        <p:cTn id="1" dur="indefinite" restart="never" nodeType="tmRoot"/>
+      </p:par>
+    </p:tnLst>
+  </p:timing>
 </p:sld>
 </file>
 
@@ -15350,6 +15378,13 @@
   <p:clrMapOvr>
     <a:masterClrMapping/>
   </p:clrMapOvr>
+  <p:timing>
+    <p:tnLst>
+      <p:par>
+        <p:cTn id="1" dur="indefinite" restart="never" nodeType="tmRoot"/>
+      </p:par>
+    </p:tnLst>
+  </p:timing>
 </p:sld>
 </file>
 
@@ -15489,6 +15524,13 @@
   <p:clrMapOvr>
     <a:masterClrMapping/>
   </p:clrMapOvr>
+  <p:timing>
+    <p:tnLst>
+      <p:par>
+        <p:cTn id="1" dur="indefinite" restart="never" nodeType="tmRoot"/>
+      </p:par>
+    </p:tnLst>
+  </p:timing>
 </p:sld>
 </file>
 
@@ -15979,6 +16021,13 @@
   <p:clrMapOvr>
     <a:masterClrMapping/>
   </p:clrMapOvr>
+  <p:timing>
+    <p:tnLst>
+      <p:par>
+        <p:cTn id="1" dur="indefinite" restart="never" nodeType="tmRoot"/>
+      </p:par>
+    </p:tnLst>
+  </p:timing>
 </p:sld>
 </file>
 
@@ -17063,6 +17112,13 @@
   <p:clrMapOvr>
     <a:masterClrMapping/>
   </p:clrMapOvr>
+  <p:timing>
+    <p:tnLst>
+      <p:par>
+        <p:cTn id="1" dur="indefinite" restart="never" nodeType="tmRoot"/>
+      </p:par>
+    </p:tnLst>
+  </p:timing>
 </p:sld>
 </file>
 
@@ -17738,6 +17794,13 @@
   <p:clrMapOvr>
     <a:masterClrMapping/>
   </p:clrMapOvr>
+  <p:timing>
+    <p:tnLst>
+      <p:par>
+        <p:cTn id="1" dur="indefinite" restart="never" nodeType="tmRoot"/>
+      </p:par>
+    </p:tnLst>
+  </p:timing>
 </p:sld>
 </file>
 
@@ -18637,6 +18700,13 @@
   <p:clrMapOvr>
     <a:masterClrMapping/>
   </p:clrMapOvr>
+  <p:timing>
+    <p:tnLst>
+      <p:par>
+        <p:cTn id="1" dur="indefinite" restart="never" nodeType="tmRoot"/>
+      </p:par>
+    </p:tnLst>
+  </p:timing>
 </p:sld>
 </file>
 
@@ -18776,22 +18846,7 @@
                 <a:cs typeface="Arial" charset="0"/>
                 <a:sym typeface="Georgia"/>
               </a:rPr>
-              <a:t>Understand a </a:t>
-            </a:r>
-            <a:r>
-              <a:rPr lang="en-US" sz="2800" dirty="0" smtClean="0">
-                <a:solidFill>
-                  <a:srgbClr val="333333"/>
-                </a:solidFill>
-                <a:highlight>
-                  <a:srgbClr val="FFFFFF"/>
-                </a:highlight>
-                <a:latin typeface="Arial" charset="0"/>
-                <a:ea typeface="Arial" charset="0"/>
-                <a:cs typeface="Arial" charset="0"/>
-                <a:sym typeface="Georgia"/>
-              </a:rPr>
-              <a:t>classification problem</a:t>
+              <a:t>Understand a classification problem</a:t>
             </a:r>
             <a:endParaRPr lang="en-US" sz="2800" dirty="0">
               <a:solidFill>
@@ -19580,6 +19635,13 @@
   <p:clrMapOvr>
     <a:masterClrMapping/>
   </p:clrMapOvr>
+  <p:timing>
+    <p:tnLst>
+      <p:par>
+        <p:cTn id="1" dur="indefinite" restart="never" nodeType="tmRoot"/>
+      </p:par>
+    </p:tnLst>
+  </p:timing>
 </p:sld>
 </file>
 
@@ -19719,6 +19781,13 @@
   <p:clrMapOvr>
     <a:masterClrMapping/>
   </p:clrMapOvr>
+  <p:timing>
+    <p:tnLst>
+      <p:par>
+        <p:cTn id="1" dur="indefinite" restart="never" nodeType="tmRoot"/>
+      </p:par>
+    </p:tnLst>
+  </p:timing>
 </p:sld>
 </file>
 
@@ -20001,6 +20070,13 @@
   <p:clrMapOvr>
     <a:masterClrMapping/>
   </p:clrMapOvr>
+  <p:timing>
+    <p:tnLst>
+      <p:par>
+        <p:cTn id="1" dur="indefinite" restart="never" nodeType="tmRoot"/>
+      </p:par>
+    </p:tnLst>
+  </p:timing>
 </p:sld>
 </file>
 
@@ -20218,6 +20294,13 @@
   <p:clrMapOvr>
     <a:masterClrMapping/>
   </p:clrMapOvr>
+  <p:timing>
+    <p:tnLst>
+      <p:par>
+        <p:cTn id="1" dur="indefinite" restart="never" nodeType="tmRoot"/>
+      </p:par>
+    </p:tnLst>
+  </p:timing>
 </p:sld>
 </file>
 
@@ -20470,6 +20553,13 @@
   <p:clrMapOvr>
     <a:masterClrMapping/>
   </p:clrMapOvr>
+  <p:timing>
+    <p:tnLst>
+      <p:par>
+        <p:cTn id="1" dur="indefinite" restart="never" nodeType="tmRoot"/>
+      </p:par>
+    </p:tnLst>
+  </p:timing>
 </p:sld>
 </file>
 
@@ -20851,6 +20941,13 @@
   <p:clrMapOvr>
     <a:masterClrMapping/>
   </p:clrMapOvr>
+  <p:timing>
+    <p:tnLst>
+      <p:par>
+        <p:cTn id="1" dur="indefinite" restart="never" nodeType="tmRoot"/>
+      </p:par>
+    </p:tnLst>
+  </p:timing>
 </p:sld>
 </file>
 
@@ -20990,6 +21087,13 @@
   <p:clrMapOvr>
     <a:masterClrMapping/>
   </p:clrMapOvr>
+  <p:timing>
+    <p:tnLst>
+      <p:par>
+        <p:cTn id="1" dur="indefinite" restart="never" nodeType="tmRoot"/>
+      </p:par>
+    </p:tnLst>
+  </p:timing>
 </p:sld>
 </file>
 
@@ -21241,6 +21345,13 @@
   <p:clrMapOvr>
     <a:masterClrMapping/>
   </p:clrMapOvr>
+  <p:timing>
+    <p:tnLst>
+      <p:par>
+        <p:cTn id="1" dur="indefinite" restart="never" nodeType="tmRoot"/>
+      </p:par>
+    </p:tnLst>
+  </p:timing>
 </p:sld>
 </file>
 
@@ -21532,6 +21643,13 @@
   <p:clrMapOvr>
     <a:masterClrMapping/>
   </p:clrMapOvr>
+  <p:timing>
+    <p:tnLst>
+      <p:par>
+        <p:cTn id="1" dur="indefinite" restart="never" nodeType="tmRoot"/>
+      </p:par>
+    </p:tnLst>
+  </p:timing>
 </p:sld>
 </file>
 
@@ -21769,6 +21887,13 @@
   <p:clrMapOvr>
     <a:masterClrMapping/>
   </p:clrMapOvr>
+  <p:timing>
+    <p:tnLst>
+      <p:par>
+        <p:cTn id="1" dur="indefinite" restart="never" nodeType="tmRoot"/>
+      </p:par>
+    </p:tnLst>
+  </p:timing>
 </p:sld>
 </file>
 
@@ -22185,6 +22310,13 @@
   <p:clrMapOvr>
     <a:masterClrMapping/>
   </p:clrMapOvr>
+  <p:timing>
+    <p:tnLst>
+      <p:par>
+        <p:cTn id="1" dur="indefinite" restart="never" nodeType="tmRoot"/>
+      </p:par>
+    </p:tnLst>
+  </p:timing>
 </p:sld>
 </file>
 
@@ -22338,6 +22470,13 @@
   <p:clrMapOvr>
     <a:masterClrMapping/>
   </p:clrMapOvr>
+  <p:timing>
+    <p:tnLst>
+      <p:par>
+        <p:cTn id="1" dur="indefinite" restart="never" nodeType="tmRoot"/>
+      </p:par>
+    </p:tnLst>
+  </p:timing>
 </p:sld>
 </file>
 
@@ -22477,6 +22616,13 @@
   <p:clrMapOvr>
     <a:masterClrMapping/>
   </p:clrMapOvr>
+  <p:timing>
+    <p:tnLst>
+      <p:par>
+        <p:cTn id="1" dur="indefinite" restart="never" nodeType="tmRoot"/>
+      </p:par>
+    </p:tnLst>
+  </p:timing>
 </p:sld>
 </file>
 
@@ -30652,6 +30798,13 @@
   <p:clrMapOvr>
     <a:masterClrMapping/>
   </p:clrMapOvr>
+  <p:timing>
+    <p:tnLst>
+      <p:par>
+        <p:cTn id="1" dur="indefinite" restart="never" nodeType="tmRoot"/>
+      </p:par>
+    </p:tnLst>
+  </p:timing>
 </p:sld>
 </file>
 
@@ -30791,6 +30944,13 @@
   <p:clrMapOvr>
     <a:masterClrMapping/>
   </p:clrMapOvr>
+  <p:timing>
+    <p:tnLst>
+      <p:par>
+        <p:cTn id="1" dur="indefinite" restart="never" nodeType="tmRoot"/>
+      </p:par>
+    </p:tnLst>
+  </p:timing>
 </p:sld>
 </file>
 
@@ -31081,6 +31241,13 @@
   <p:clrMapOvr>
     <a:masterClrMapping/>
   </p:clrMapOvr>
+  <p:timing>
+    <p:tnLst>
+      <p:par>
+        <p:cTn id="1" dur="indefinite" restart="never" nodeType="tmRoot"/>
+      </p:par>
+    </p:tnLst>
+  </p:timing>
 </p:sld>
 </file>
 
@@ -31500,6 +31667,13 @@
   <p:clrMapOvr>
     <a:masterClrMapping/>
   </p:clrMapOvr>
+  <p:timing>
+    <p:tnLst>
+      <p:par>
+        <p:cTn id="1" dur="indefinite" restart="never" nodeType="tmRoot"/>
+      </p:par>
+    </p:tnLst>
+  </p:timing>
 </p:sld>
 </file>
 
@@ -31780,6 +31954,13 @@
   <p:clrMapOvr>
     <a:masterClrMapping/>
   </p:clrMapOvr>
+  <p:timing>
+    <p:tnLst>
+      <p:par>
+        <p:cTn id="1" dur="indefinite" restart="never" nodeType="tmRoot"/>
+      </p:par>
+    </p:tnLst>
+  </p:timing>
 </p:sld>
 </file>
 

</xml_diff>